<commit_message>
Proj3 Final Paper & Presentation
Updated readme final, final paper, final presentation slides. Finished creating all graphics for final paper and presentation. Interpretation of results and boostrap standard errors and confidence intervals
</commit_message>
<xml_diff>
--- a/Project2/Reports/Proj2Slides.pptx
+++ b/Project2/Reports/Proj2Slides.pptx
@@ -304,7 +304,7 @@
           <a:p>
             <a:fld id="{4C1845B5-6C4F-9F4E-BDE0-3BFA9D405853}" type="datetimeFigureOut">
               <a:rPr lang="en-US" smtClean="0"/>
-              <a:t>11/1/17</a:t>
+              <a:t>11/27/17</a:t>
             </a:fld>
             <a:endParaRPr lang="en-US"/>
           </a:p>
@@ -469,7 +469,7 @@
           <a:p>
             <a:fld id="{4C1845B5-6C4F-9F4E-BDE0-3BFA9D405853}" type="datetimeFigureOut">
               <a:rPr lang="en-US" smtClean="0"/>
-              <a:t>11/1/17</a:t>
+              <a:t>11/27/17</a:t>
             </a:fld>
             <a:endParaRPr lang="en-US"/>
           </a:p>
@@ -644,7 +644,7 @@
           <a:p>
             <a:fld id="{4C1845B5-6C4F-9F4E-BDE0-3BFA9D405853}" type="datetimeFigureOut">
               <a:rPr lang="en-US" smtClean="0"/>
-              <a:t>11/1/17</a:t>
+              <a:t>11/27/17</a:t>
             </a:fld>
             <a:endParaRPr lang="en-US"/>
           </a:p>
@@ -827,7 +827,7 @@
           <a:p>
             <a:fld id="{4C1845B5-6C4F-9F4E-BDE0-3BFA9D405853}" type="datetimeFigureOut">
               <a:rPr lang="en-US" smtClean="0"/>
-              <a:t>11/1/17</a:t>
+              <a:t>11/27/17</a:t>
             </a:fld>
             <a:endParaRPr lang="en-US"/>
           </a:p>
@@ -1089,7 +1089,7 @@
           <a:p>
             <a:fld id="{4C1845B5-6C4F-9F4E-BDE0-3BFA9D405853}" type="datetimeFigureOut">
               <a:rPr lang="en-US" smtClean="0"/>
-              <a:t>11/1/17</a:t>
+              <a:t>11/27/17</a:t>
             </a:fld>
             <a:endParaRPr lang="en-US"/>
           </a:p>
@@ -1437,7 +1437,7 @@
           <a:p>
             <a:fld id="{4C1845B5-6C4F-9F4E-BDE0-3BFA9D405853}" type="datetimeFigureOut">
               <a:rPr lang="en-US" smtClean="0"/>
-              <a:t>11/1/17</a:t>
+              <a:t>11/27/17</a:t>
             </a:fld>
             <a:endParaRPr lang="en-US"/>
           </a:p>
@@ -1745,7 +1745,7 @@
           <a:p>
             <a:fld id="{4C1845B5-6C4F-9F4E-BDE0-3BFA9D405853}" type="datetimeFigureOut">
               <a:rPr lang="en-US" smtClean="0"/>
-              <a:t>11/1/17</a:t>
+              <a:t>11/27/17</a:t>
             </a:fld>
             <a:endParaRPr lang="en-US"/>
           </a:p>
@@ -1972,7 +1972,7 @@
           <a:p>
             <a:fld id="{4C1845B5-6C4F-9F4E-BDE0-3BFA9D405853}" type="datetimeFigureOut">
               <a:rPr lang="en-US" smtClean="0"/>
-              <a:t>11/1/17</a:t>
+              <a:t>11/27/17</a:t>
             </a:fld>
             <a:endParaRPr lang="en-US"/>
           </a:p>
@@ -2062,7 +2062,7 @@
           <a:p>
             <a:fld id="{4C1845B5-6C4F-9F4E-BDE0-3BFA9D405853}" type="datetimeFigureOut">
               <a:rPr lang="en-US" smtClean="0"/>
-              <a:t>11/1/17</a:t>
+              <a:t>11/27/17</a:t>
             </a:fld>
             <a:endParaRPr lang="en-US"/>
           </a:p>
@@ -2350,7 +2350,7 @@
           <a:p>
             <a:fld id="{4C1845B5-6C4F-9F4E-BDE0-3BFA9D405853}" type="datetimeFigureOut">
               <a:rPr lang="en-US" smtClean="0"/>
-              <a:t>11/1/17</a:t>
+              <a:t>11/27/17</a:t>
             </a:fld>
             <a:endParaRPr lang="en-US"/>
           </a:p>
@@ -2619,7 +2619,7 @@
           <a:p>
             <a:fld id="{4C1845B5-6C4F-9F4E-BDE0-3BFA9D405853}" type="datetimeFigureOut">
               <a:rPr lang="en-US" smtClean="0"/>
-              <a:t>11/1/17</a:t>
+              <a:t>11/27/17</a:t>
             </a:fld>
             <a:endParaRPr lang="en-US"/>
           </a:p>
@@ -2829,7 +2829,7 @@
           <a:p>
             <a:fld id="{4C1845B5-6C4F-9F4E-BDE0-3BFA9D405853}" type="datetimeFigureOut">
               <a:rPr lang="en-US" smtClean="0"/>
-              <a:t>11/1/17</a:t>
+              <a:t>11/27/17</a:t>
             </a:fld>
             <a:endParaRPr lang="en-US"/>
           </a:p>

</xml_diff>